<commit_message>
update presentation: decision making added
</commit_message>
<xml_diff>
--- a/Health_Care_Bot.pptx
+++ b/Health_Care_Bot.pptx
@@ -228,7 +228,7 @@
           <a:p>
             <a:fld id="{E5CB2E47-6F41-409B-AD22-834AE1EFF186}" type="datetimeFigureOut">
               <a:rPr lang="en-US" smtClean="0"/>
-              <a:t>29-May-17</a:t>
+              <a:t>01-Jun-17</a:t>
             </a:fld>
             <a:endParaRPr lang="en-US"/>
           </a:p>
@@ -393,7 +393,7 @@
           <a:p>
             <a:fld id="{FAD6744A-403D-42A1-BFE7-61DA46EE7C6C}" type="datetimeFigureOut">
               <a:rPr lang="en-US" smtClean="0"/>
-              <a:t>29-May-17</a:t>
+              <a:t>01-Jun-17</a:t>
             </a:fld>
             <a:endParaRPr lang="en-US"/>
           </a:p>
@@ -788,7 +788,7 @@
           <a:p>
             <a:fld id="{349BF3EA-1A78-4F07-BDC0-C8A1BD461199}" type="datetimeFigureOut">
               <a:rPr lang="en-US" smtClean="0"/>
-              <a:t>29-May-17</a:t>
+              <a:t>01-Jun-17</a:t>
             </a:fld>
             <a:endParaRPr lang="en-US"/>
           </a:p>
@@ -1196,7 +1196,7 @@
           <a:p>
             <a:fld id="{349BF3EA-1A78-4F07-BDC0-C8A1BD461199}" type="datetimeFigureOut">
               <a:rPr lang="en-US" smtClean="0"/>
-              <a:t>29-May-17</a:t>
+              <a:t>01-Jun-17</a:t>
             </a:fld>
             <a:endParaRPr lang="en-US"/>
           </a:p>
@@ -1325,7 +1325,7 @@
           <a:p>
             <a:fld id="{349BF3EA-1A78-4F07-BDC0-C8A1BD461199}" type="datetimeFigureOut">
               <a:rPr lang="en-US" smtClean="0"/>
-              <a:t>29-May-17</a:t>
+              <a:t>01-Jun-17</a:t>
             </a:fld>
             <a:endParaRPr lang="en-US"/>
           </a:p>
@@ -1516,7 +1516,7 @@
           <a:p>
             <a:fld id="{349BF3EA-1A78-4F07-BDC0-C8A1BD461199}" type="datetimeFigureOut">
               <a:rPr lang="en-US" smtClean="0"/>
-              <a:t>29-May-17</a:t>
+              <a:t>01-Jun-17</a:t>
             </a:fld>
             <a:endParaRPr lang="en-US"/>
           </a:p>
@@ -1796,7 +1796,7 @@
           <a:p>
             <a:fld id="{349BF3EA-1A78-4F07-BDC0-C8A1BD461199}" type="datetimeFigureOut">
               <a:rPr lang="en-US" smtClean="0"/>
-              <a:t>29-May-17</a:t>
+              <a:t>01-Jun-17</a:t>
             </a:fld>
             <a:endParaRPr lang="en-US"/>
           </a:p>
@@ -2165,7 +2165,7 @@
           <a:p>
             <a:fld id="{349BF3EA-1A78-4F07-BDC0-C8A1BD461199}" type="datetimeFigureOut">
               <a:rPr lang="en-US" smtClean="0"/>
-              <a:t>29-May-17</a:t>
+              <a:t>01-Jun-17</a:t>
             </a:fld>
             <a:endParaRPr lang="en-US"/>
           </a:p>
@@ -2408,7 +2408,7 @@
           <a:p>
             <a:fld id="{349BF3EA-1A78-4F07-BDC0-C8A1BD461199}" type="datetimeFigureOut">
               <a:rPr lang="en-US" smtClean="0"/>
-              <a:t>29-May-17</a:t>
+              <a:t>01-Jun-17</a:t>
             </a:fld>
             <a:endParaRPr lang="en-US"/>
           </a:p>
@@ -2786,7 +2786,7 @@
           <a:p>
             <a:fld id="{349BF3EA-1A78-4F07-BDC0-C8A1BD461199}" type="datetimeFigureOut">
               <a:rPr lang="en-US" smtClean="0"/>
-              <a:t>29-May-17</a:t>
+              <a:t>01-Jun-17</a:t>
             </a:fld>
             <a:endParaRPr lang="en-US"/>
           </a:p>
@@ -2915,7 +2915,7 @@
           <a:p>
             <a:fld id="{349BF3EA-1A78-4F07-BDC0-C8A1BD461199}" type="datetimeFigureOut">
               <a:rPr lang="en-US" smtClean="0"/>
-              <a:t>29-May-17</a:t>
+              <a:t>01-Jun-17</a:t>
             </a:fld>
             <a:endParaRPr lang="en-US"/>
           </a:p>
@@ -3117,7 +3117,7 @@
           <a:p>
             <a:fld id="{349BF3EA-1A78-4F07-BDC0-C8A1BD461199}" type="datetimeFigureOut">
               <a:rPr lang="en-US" smtClean="0"/>
-              <a:t>29-May-17</a:t>
+              <a:t>01-Jun-17</a:t>
             </a:fld>
             <a:endParaRPr lang="en-US"/>
           </a:p>
@@ -3363,7 +3363,7 @@
           <a:p>
             <a:fld id="{349BF3EA-1A78-4F07-BDC0-C8A1BD461199}" type="datetimeFigureOut">
               <a:rPr lang="en-US" smtClean="0"/>
-              <a:t>29-May-17</a:t>
+              <a:t>01-Jun-17</a:t>
             </a:fld>
             <a:endParaRPr lang="en-US"/>
           </a:p>
@@ -3865,7 +3865,7 @@
           <a:p>
             <a:fld id="{349BF3EA-1A78-4F07-BDC0-C8A1BD461199}" type="datetimeFigureOut">
               <a:rPr lang="en-US" smtClean="0"/>
-              <a:t>29-May-17</a:t>
+              <a:t>01-Jun-17</a:t>
             </a:fld>
             <a:endParaRPr lang="en-US"/>
           </a:p>
@@ -6578,8 +6578,132 @@
           <a:lstStyle/>
           <a:p>
             <a:r>
+              <a:rPr lang="en-US" dirty="0"/>
+              <a:t>Compute scores</a:t>
+            </a:r>
+          </a:p>
+          <a:p>
+            <a:endParaRPr lang="en-US" dirty="0"/>
+          </a:p>
+          <a:p>
+            <a:endParaRPr lang="en-US" dirty="0"/>
+          </a:p>
+          <a:p>
+            <a:endParaRPr lang="en-US" dirty="0"/>
+          </a:p>
+          <a:p>
+            <a:r>
+              <a:rPr lang="en-US" dirty="0"/>
+              <a:t>The higher scores are chosen as the most probable sicknesses </a:t>
+            </a:r>
+          </a:p>
+          <a:p>
+            <a:r>
               <a:rPr lang="fr-FR" dirty="0"/>
-              <a:t>TODO</a:t>
+              <a:t>I</a:t>
+            </a:r>
+            <a:r>
+              <a:rPr lang="en-US" dirty="0"/>
+              <a:t>n the case of a draw we use personal information to decide between the two</a:t>
+            </a:r>
+          </a:p>
+          <a:p>
+            <a:pPr lvl="1"/>
+            <a:r>
+              <a:rPr lang="fr-FR" dirty="0" err="1"/>
+              <a:t>Example</a:t>
+            </a:r>
+            <a:r>
+              <a:rPr lang="fr-FR" dirty="0"/>
+              <a:t> : </a:t>
+            </a:r>
+            <a:r>
+              <a:rPr lang="fr-FR" dirty="0" err="1"/>
+              <a:t>draw</a:t>
+            </a:r>
+            <a:r>
+              <a:rPr lang="fr-FR" dirty="0"/>
+              <a:t> </a:t>
+            </a:r>
+            <a:r>
+              <a:rPr lang="fr-FR" dirty="0" err="1"/>
+              <a:t>between</a:t>
+            </a:r>
+            <a:r>
+              <a:rPr lang="fr-FR" dirty="0"/>
+              <a:t> </a:t>
+            </a:r>
+            <a:r>
+              <a:rPr lang="fr-FR" dirty="0" err="1"/>
+              <a:t>flu</a:t>
+            </a:r>
+            <a:r>
+              <a:rPr lang="fr-FR" dirty="0"/>
+              <a:t> and </a:t>
+            </a:r>
+            <a:r>
+              <a:rPr lang="fr-FR" dirty="0" err="1"/>
+              <a:t>pneumonia</a:t>
+            </a:r>
+            <a:r>
+              <a:rPr lang="fr-FR" dirty="0"/>
+              <a:t> + the patient </a:t>
+            </a:r>
+            <a:r>
+              <a:rPr lang="fr-FR" dirty="0" err="1"/>
+              <a:t>is</a:t>
+            </a:r>
+            <a:r>
+              <a:rPr lang="fr-FR" dirty="0"/>
+              <a:t> a smocker </a:t>
+            </a:r>
+            <a:r>
+              <a:rPr lang="fr-FR" dirty="0">
+                <a:sym typeface="Wingdings" panose="05000000000000000000" pitchFamily="2" charset="2"/>
+              </a:rPr>
+              <a:t> </a:t>
+            </a:r>
+            <a:r>
+              <a:rPr lang="fr-FR" dirty="0" err="1">
+                <a:sym typeface="Wingdings" panose="05000000000000000000" pitchFamily="2" charset="2"/>
+              </a:rPr>
+              <a:t>pneumonia</a:t>
+            </a:r>
+            <a:r>
+              <a:rPr lang="fr-FR" dirty="0">
+                <a:sym typeface="Wingdings" panose="05000000000000000000" pitchFamily="2" charset="2"/>
+              </a:rPr>
+              <a:t> </a:t>
+            </a:r>
+            <a:r>
+              <a:rPr lang="fr-FR" dirty="0" err="1">
+                <a:sym typeface="Wingdings" panose="05000000000000000000" pitchFamily="2" charset="2"/>
+              </a:rPr>
+              <a:t>is</a:t>
+            </a:r>
+            <a:r>
+              <a:rPr lang="fr-FR" dirty="0">
+                <a:sym typeface="Wingdings" panose="05000000000000000000" pitchFamily="2" charset="2"/>
+              </a:rPr>
+              <a:t> </a:t>
+            </a:r>
+            <a:r>
+              <a:rPr lang="fr-FR" dirty="0" err="1">
+                <a:sym typeface="Wingdings" panose="05000000000000000000" pitchFamily="2" charset="2"/>
+              </a:rPr>
+              <a:t>chosen</a:t>
+            </a:r>
+            <a:r>
+              <a:rPr lang="fr-FR" dirty="0">
+                <a:sym typeface="Wingdings" panose="05000000000000000000" pitchFamily="2" charset="2"/>
+              </a:rPr>
+              <a:t> over </a:t>
+            </a:r>
+            <a:r>
+              <a:rPr lang="fr-FR" dirty="0" err="1">
+                <a:sym typeface="Wingdings" panose="05000000000000000000" pitchFamily="2" charset="2"/>
+              </a:rPr>
+              <a:t>flu</a:t>
             </a:r>
             <a:endParaRPr lang="en-US" dirty="0"/>
           </a:p>
@@ -6612,6 +6736,238 @@
           </a:p>
         </p:txBody>
       </p:sp>
+      <mc:AlternateContent xmlns:mc="http://schemas.openxmlformats.org/markup-compatibility/2006">
+        <mc:Choice xmlns:a14="http://schemas.microsoft.com/office/drawing/2010/main" Requires="a14">
+          <p:sp>
+            <p:nvSpPr>
+              <p:cNvPr id="4" name="TextBox 3"/>
+              <p:cNvSpPr txBox="1"/>
+              <p:nvPr/>
+            </p:nvSpPr>
+            <p:spPr>
+              <a:xfrm>
+                <a:off x="3303313" y="2365568"/>
+                <a:ext cx="5585375" cy="575157"/>
+              </a:xfrm>
+              <a:prstGeom prst="rect">
+                <a:avLst/>
+              </a:prstGeom>
+              <a:noFill/>
+              <a:ln>
+                <a:solidFill>
+                  <a:schemeClr val="bg2"/>
+                </a:solidFill>
+              </a:ln>
+            </p:spPr>
+            <p:txBody>
+              <a:bodyPr wrap="none" lIns="0" tIns="0" rIns="0" bIns="0" rtlCol="0" anchor="ctr" anchorCtr="1">
+                <a:spAutoFit/>
+              </a:bodyPr>
+              <a:lstStyle/>
+              <a:p>
+                <a14:m>
+                  <m:oMathPara xmlns:m="http://schemas.openxmlformats.org/officeDocument/2006/math">
+                    <m:oMathParaPr>
+                      <m:jc m:val="centerGroup"/>
+                    </m:oMathParaPr>
+                    <m:oMath xmlns:m="http://schemas.openxmlformats.org/officeDocument/2006/math">
+                      <m:r>
+                        <a:rPr lang="fr-FR" b="0" i="1" smtClean="0">
+                          <a:latin typeface="Cambria Math" panose="02040503050406030204" pitchFamily="18" charset="0"/>
+                        </a:rPr>
+                        <m:t>𝑆𝑐𝑜𝑟𝑒</m:t>
+                      </m:r>
+                      <m:r>
+                        <a:rPr lang="fr-FR" b="0" i="1" smtClean="0">
+                          <a:latin typeface="Cambria Math" panose="02040503050406030204" pitchFamily="18" charset="0"/>
+                        </a:rPr>
+                        <m:t>= </m:t>
+                      </m:r>
+                      <m:f>
+                        <m:fPr>
+                          <m:ctrlPr>
+                            <a:rPr lang="fr-FR" b="0" i="1" smtClean="0">
+                              <a:latin typeface="Cambria Math" panose="02040503050406030204" pitchFamily="18" charset="0"/>
+                            </a:rPr>
+                          </m:ctrlPr>
+                        </m:fPr>
+                        <m:num>
+                          <m:r>
+                            <a:rPr lang="fr-FR" b="0" i="1" smtClean="0">
+                              <a:latin typeface="Cambria Math" panose="02040503050406030204" pitchFamily="18" charset="0"/>
+                            </a:rPr>
+                            <m:t>𝑁𝑢𝑚𝑏𝑒𝑟</m:t>
+                          </m:r>
+                          <m:r>
+                            <a:rPr lang="fr-FR" b="0" i="1" smtClean="0">
+                              <a:latin typeface="Cambria Math" panose="02040503050406030204" pitchFamily="18" charset="0"/>
+                            </a:rPr>
+                            <m:t> </m:t>
+                          </m:r>
+                          <m:r>
+                            <a:rPr lang="fr-FR" b="0" i="1" smtClean="0">
+                              <a:latin typeface="Cambria Math" panose="02040503050406030204" pitchFamily="18" charset="0"/>
+                            </a:rPr>
+                            <m:t>𝑜𝑓</m:t>
+                          </m:r>
+                          <m:r>
+                            <a:rPr lang="fr-FR" b="0" i="1" smtClean="0">
+                              <a:latin typeface="Cambria Math" panose="02040503050406030204" pitchFamily="18" charset="0"/>
+                            </a:rPr>
+                            <m:t> </m:t>
+                          </m:r>
+                          <m:r>
+                            <a:rPr lang="fr-FR" b="0" i="1" smtClean="0">
+                              <a:latin typeface="Cambria Math" panose="02040503050406030204" pitchFamily="18" charset="0"/>
+                            </a:rPr>
+                            <m:t>𝑐𝑜𝑚𝑚𝑜𝑛</m:t>
+                          </m:r>
+                          <m:r>
+                            <a:rPr lang="fr-FR" b="0" i="1" smtClean="0">
+                              <a:latin typeface="Cambria Math" panose="02040503050406030204" pitchFamily="18" charset="0"/>
+                            </a:rPr>
+                            <m:t> </m:t>
+                          </m:r>
+                          <m:r>
+                            <a:rPr lang="fr-FR" b="0" i="1" smtClean="0">
+                              <a:latin typeface="Cambria Math" panose="02040503050406030204" pitchFamily="18" charset="0"/>
+                            </a:rPr>
+                            <m:t>𝑠𝑦𝑚𝑝𝑡𝑜𝑚𝑠</m:t>
+                          </m:r>
+                        </m:num>
+                        <m:den>
+                          <m:r>
+                            <a:rPr lang="fr-FR" b="0" i="1" smtClean="0">
+                              <a:latin typeface="Cambria Math" panose="02040503050406030204" pitchFamily="18" charset="0"/>
+                            </a:rPr>
+                            <m:t>𝑇𝑜𝑡𝑎𝑙</m:t>
+                          </m:r>
+                          <m:r>
+                            <a:rPr lang="fr-FR" b="0" i="1" smtClean="0">
+                              <a:latin typeface="Cambria Math" panose="02040503050406030204" pitchFamily="18" charset="0"/>
+                            </a:rPr>
+                            <m:t> </m:t>
+                          </m:r>
+                          <m:r>
+                            <a:rPr lang="fr-FR" b="0" i="1" smtClean="0">
+                              <a:latin typeface="Cambria Math" panose="02040503050406030204" pitchFamily="18" charset="0"/>
+                            </a:rPr>
+                            <m:t>𝑛𝑢𝑚𝑏𝑒𝑟</m:t>
+                          </m:r>
+                          <m:r>
+                            <a:rPr lang="fr-FR" b="0" i="1" smtClean="0">
+                              <a:latin typeface="Cambria Math" panose="02040503050406030204" pitchFamily="18" charset="0"/>
+                            </a:rPr>
+                            <m:t> </m:t>
+                          </m:r>
+                          <m:r>
+                            <a:rPr lang="fr-FR" b="0" i="1" smtClean="0">
+                              <a:latin typeface="Cambria Math" panose="02040503050406030204" pitchFamily="18" charset="0"/>
+                            </a:rPr>
+                            <m:t>𝑜𝑓</m:t>
+                          </m:r>
+                          <m:r>
+                            <a:rPr lang="fr-FR" b="0" i="1" smtClean="0">
+                              <a:latin typeface="Cambria Math" panose="02040503050406030204" pitchFamily="18" charset="0"/>
+                            </a:rPr>
+                            <m:t> </m:t>
+                          </m:r>
+                          <m:r>
+                            <a:rPr lang="fr-FR" b="0" i="1" smtClean="0">
+                              <a:latin typeface="Cambria Math" panose="02040503050406030204" pitchFamily="18" charset="0"/>
+                            </a:rPr>
+                            <m:t>𝑠𝑦𝑚𝑝𝑡𝑜𝑚𝑠</m:t>
+                          </m:r>
+                          <m:r>
+                            <a:rPr lang="fr-FR" b="0" i="1" smtClean="0">
+                              <a:latin typeface="Cambria Math" panose="02040503050406030204" pitchFamily="18" charset="0"/>
+                            </a:rPr>
+                            <m:t> </m:t>
+                          </m:r>
+                          <m:r>
+                            <a:rPr lang="fr-FR" b="0" i="1" smtClean="0">
+                              <a:latin typeface="Cambria Math" panose="02040503050406030204" pitchFamily="18" charset="0"/>
+                            </a:rPr>
+                            <m:t>𝑓𝑜𝑟</m:t>
+                          </m:r>
+                          <m:r>
+                            <a:rPr lang="fr-FR" b="0" i="1" smtClean="0">
+                              <a:latin typeface="Cambria Math" panose="02040503050406030204" pitchFamily="18" charset="0"/>
+                            </a:rPr>
+                            <m:t> </m:t>
+                          </m:r>
+                          <m:r>
+                            <a:rPr lang="fr-FR" b="0" i="1" smtClean="0">
+                              <a:latin typeface="Cambria Math" panose="02040503050406030204" pitchFamily="18" charset="0"/>
+                            </a:rPr>
+                            <m:t>𝑡h𝑒</m:t>
+                          </m:r>
+                          <m:r>
+                            <a:rPr lang="fr-FR" b="0" i="1" smtClean="0">
+                              <a:latin typeface="Cambria Math" panose="02040503050406030204" pitchFamily="18" charset="0"/>
+                            </a:rPr>
+                            <m:t> </m:t>
+                          </m:r>
+                          <m:r>
+                            <a:rPr lang="fr-FR" b="0" i="1" smtClean="0">
+                              <a:latin typeface="Cambria Math" panose="02040503050406030204" pitchFamily="18" charset="0"/>
+                            </a:rPr>
+                            <m:t>𝑠𝑖𝑐𝑘𝑛𝑒𝑠𝑠</m:t>
+                          </m:r>
+                        </m:den>
+                      </m:f>
+                    </m:oMath>
+                  </m:oMathPara>
+                </a14:m>
+                <a:endParaRPr lang="en-US" dirty="0"/>
+              </a:p>
+            </p:txBody>
+          </p:sp>
+        </mc:Choice>
+        <mc:Fallback>
+          <p:sp>
+            <p:nvSpPr>
+              <p:cNvPr id="4" name="TextBox 3"/>
+              <p:cNvSpPr txBox="1">
+                <a:spLocks noRot="1" noChangeAspect="1" noMove="1" noResize="1" noEditPoints="1" noAdjustHandles="1" noChangeArrowheads="1" noChangeShapeType="1" noTextEdit="1"/>
+              </p:cNvSpPr>
+              <p:nvPr/>
+            </p:nvSpPr>
+            <p:spPr>
+              <a:xfrm>
+                <a:off x="3303313" y="2365568"/>
+                <a:ext cx="5585375" cy="575157"/>
+              </a:xfrm>
+              <a:prstGeom prst="rect">
+                <a:avLst/>
+              </a:prstGeom>
+              <a:blipFill>
+                <a:blip r:embed="rId2"/>
+                <a:stretch>
+                  <a:fillRect/>
+                </a:stretch>
+              </a:blipFill>
+              <a:ln>
+                <a:solidFill>
+                  <a:schemeClr val="bg2"/>
+                </a:solidFill>
+              </a:ln>
+            </p:spPr>
+            <p:txBody>
+              <a:bodyPr/>
+              <a:lstStyle/>
+              <a:p>
+                <a:r>
+                  <a:rPr lang="en-US">
+                    <a:noFill/>
+                  </a:rPr>
+                  <a:t> </a:t>
+                </a:r>
+              </a:p>
+            </p:txBody>
+          </p:sp>
+        </mc:Fallback>
+      </mc:AlternateContent>
     </p:spTree>
     <p:extLst>
       <p:ext uri="{BB962C8B-B14F-4D97-AF65-F5344CB8AC3E}">

</xml_diff>